<commit_message>
Add the remaining arrow in the FPGA Block Diagram
</commit_message>
<xml_diff>
--- a/_static/fpga-camera-figs/fpga-diagram-complete.pptx
+++ b/_static/fpga-camera-figs/fpga-diagram-complete.pptx
@@ -104,6 +104,22 @@
       </a:defRPr>
     </a:lvl9pPr>
   </p:defaultTextStyle>
+  <p:extLst>
+    <p:ext uri="{EFAFB233-063F-42B5-8137-9DF3F51BA10A}">
+      <p15:sldGuideLst xmlns:p15="http://schemas.microsoft.com/office/powerpoint/2012/main">
+        <p15:guide id="1" orient="horz" pos="2160">
+          <p15:clr>
+            <a:srgbClr val="A4A3A4"/>
+          </p15:clr>
+        </p15:guide>
+        <p15:guide id="2" pos="2880">
+          <p15:clr>
+            <a:srgbClr val="A4A3A4"/>
+          </p15:clr>
+        </p15:guide>
+      </p15:sldGuideLst>
+    </p:ext>
+  </p:extLst>
 </p:presentation>
 </file>
 
@@ -218,7 +234,7 @@
             <a:fld id="{80512062-9D2D-4A41-B732-10B0699BFABE}" type="datetime1">
               <a:rPr lang="es-ES"/>
               <a:pPr lvl="0"/>
-              <a:t>06/02/2018</a:t>
+              <a:t>27/06/2018</a:t>
             </a:fld>
             <a:endParaRPr lang="es-ES"/>
           </a:p>
@@ -269,7 +285,7 @@
           <a:p>
             <a:pPr lvl="0"/>
             <a:fld id="{7913A36C-2FE9-4F7D-AD6C-00CF56EC141F}" type="slidenum">
-              <a:t>‹#›</a:t>
+              <a:t>‹Nº›</a:t>
             </a:fld>
             <a:endParaRPr lang="es-ES"/>
           </a:p>
@@ -433,7 +449,7 @@
             <a:fld id="{D26708A4-9768-4FA6-BE54-A36C7B42000B}" type="datetime1">
               <a:rPr lang="es-ES"/>
               <a:pPr lvl="0"/>
-              <a:t>06/02/2018</a:t>
+              <a:t>27/06/2018</a:t>
             </a:fld>
             <a:endParaRPr lang="es-ES"/>
           </a:p>
@@ -484,7 +500,7 @@
           <a:p>
             <a:pPr lvl="0"/>
             <a:fld id="{2DDEFD71-1997-461B-B4DC-F6C0737E8D81}" type="slidenum">
-              <a:t>‹#›</a:t>
+              <a:t>‹Nº›</a:t>
             </a:fld>
             <a:endParaRPr lang="es-ES"/>
           </a:p>
@@ -657,7 +673,7 @@
             <a:fld id="{A43FC16E-FF57-4C5B-819D-FC9F2EE024D6}" type="datetime1">
               <a:rPr lang="es-ES"/>
               <a:pPr lvl="0"/>
-              <a:t>06/02/2018</a:t>
+              <a:t>27/06/2018</a:t>
             </a:fld>
             <a:endParaRPr lang="es-ES"/>
           </a:p>
@@ -708,7 +724,7 @@
           <a:p>
             <a:pPr lvl="0"/>
             <a:fld id="{669F5936-0A67-4AAC-A916-3B112528A10A}" type="slidenum">
-              <a:t>‹#›</a:t>
+              <a:t>‹Nº›</a:t>
             </a:fld>
             <a:endParaRPr lang="es-ES"/>
           </a:p>
@@ -871,7 +887,7 @@
             <a:fld id="{CBCBEAFA-9DFD-4EA5-AC7D-7975012BFB42}" type="datetime1">
               <a:rPr lang="es-ES"/>
               <a:pPr lvl="0"/>
-              <a:t>06/02/2018</a:t>
+              <a:t>27/06/2018</a:t>
             </a:fld>
             <a:endParaRPr lang="es-ES"/>
           </a:p>
@@ -922,7 +938,7 @@
           <a:p>
             <a:pPr lvl="0"/>
             <a:fld id="{2EE38332-F798-48AC-AB8A-8AC5D9BAC2CE}" type="slidenum">
-              <a:t>‹#›</a:t>
+              <a:t>‹Nº›</a:t>
             </a:fld>
             <a:endParaRPr lang="es-ES"/>
           </a:p>
@@ -1062,7 +1078,7 @@
             <a:fld id="{A504878C-E465-4B3A-A837-2B516E341B49}" type="datetime1">
               <a:rPr lang="es-ES"/>
               <a:pPr lvl="0"/>
-              <a:t>06/02/2018</a:t>
+              <a:t>27/06/2018</a:t>
             </a:fld>
             <a:endParaRPr lang="es-ES"/>
           </a:p>
@@ -1113,7 +1129,7 @@
           <a:p>
             <a:pPr lvl="0"/>
             <a:fld id="{781253D8-4F07-4D21-8497-C22CB948937F}" type="slidenum">
-              <a:t>‹#›</a:t>
+              <a:t>‹Nº›</a:t>
             </a:fld>
             <a:endParaRPr lang="es-ES"/>
           </a:p>
@@ -1384,7 +1400,7 @@
             <a:fld id="{C6874F89-F7AD-4988-BFA8-3B88B45F8E26}" type="datetime1">
               <a:rPr lang="es-ES"/>
               <a:pPr lvl="0"/>
-              <a:t>06/02/2018</a:t>
+              <a:t>27/06/2018</a:t>
             </a:fld>
             <a:endParaRPr lang="es-ES"/>
           </a:p>
@@ -1435,7 +1451,7 @@
           <a:p>
             <a:pPr lvl="0"/>
             <a:fld id="{59E45B8C-3B13-4AEC-97CC-D5D73C5B49BD}" type="slidenum">
-              <a:t>‹#›</a:t>
+              <a:t>‹Nº›</a:t>
             </a:fld>
             <a:endParaRPr lang="es-ES"/>
           </a:p>
@@ -1778,7 +1794,7 @@
             <a:fld id="{DA828D44-F66E-4FF5-9F51-AD545ABDDD50}" type="datetime1">
               <a:rPr lang="es-ES"/>
               <a:pPr lvl="0"/>
-              <a:t>06/02/2018</a:t>
+              <a:t>27/06/2018</a:t>
             </a:fld>
             <a:endParaRPr lang="es-ES"/>
           </a:p>
@@ -1829,7 +1845,7 @@
           <a:p>
             <a:pPr lvl="0"/>
             <a:fld id="{6A2E811E-F017-437D-88C2-5CB612153AAC}" type="slidenum">
-              <a:t>‹#›</a:t>
+              <a:t>‹Nº›</a:t>
             </a:fld>
             <a:endParaRPr lang="es-ES"/>
           </a:p>
@@ -1924,7 +1940,7 @@
             <a:fld id="{07A439F4-33A6-4D12-8F28-DC3D8BEAE60C}" type="datetime1">
               <a:rPr lang="es-ES"/>
               <a:pPr lvl="0"/>
-              <a:t>06/02/2018</a:t>
+              <a:t>27/06/2018</a:t>
             </a:fld>
             <a:endParaRPr lang="es-ES"/>
           </a:p>
@@ -1975,7 +1991,7 @@
           <a:p>
             <a:pPr lvl="0"/>
             <a:fld id="{E19C5DBA-A7F4-4ABD-BC37-9C0D4C566492}" type="slidenum">
-              <a:t>‹#›</a:t>
+              <a:t>‹Nº›</a:t>
             </a:fld>
             <a:endParaRPr lang="es-ES"/>
           </a:p>
@@ -2042,7 +2058,7 @@
             <a:fld id="{B714AA68-DF44-4F57-9A5A-963D7F3B65CA}" type="datetime1">
               <a:rPr lang="es-ES"/>
               <a:pPr lvl="0"/>
-              <a:t>06/02/2018</a:t>
+              <a:t>27/06/2018</a:t>
             </a:fld>
             <a:endParaRPr lang="es-ES"/>
           </a:p>
@@ -2093,7 +2109,7 @@
           <a:p>
             <a:pPr lvl="0"/>
             <a:fld id="{3B98F06E-301F-473A-9D01-0AE88F7B80E5}" type="slidenum">
-              <a:t>‹#›</a:t>
+              <a:t>‹Nº›</a:t>
             </a:fld>
             <a:endParaRPr lang="es-ES"/>
           </a:p>
@@ -2302,7 +2318,7 @@
             <a:fld id="{BBECBBA7-0B34-4824-9FCA-21C67B4270A8}" type="datetime1">
               <a:rPr lang="es-ES"/>
               <a:pPr lvl="0"/>
-              <a:t>06/02/2018</a:t>
+              <a:t>27/06/2018</a:t>
             </a:fld>
             <a:endParaRPr lang="es-ES"/>
           </a:p>
@@ -2353,7 +2369,7 @@
           <a:p>
             <a:pPr lvl="0"/>
             <a:fld id="{82397154-7239-441A-8F69-3745104BD340}" type="slidenum">
-              <a:t>‹#›</a:t>
+              <a:t>‹Nº›</a:t>
             </a:fld>
             <a:endParaRPr lang="es-ES"/>
           </a:p>
@@ -2519,7 +2535,7 @@
             <a:fld id="{FB6F2E0F-741B-40E6-97DD-8EDAEE10536B}" type="datetime1">
               <a:rPr lang="es-ES"/>
               <a:pPr lvl="0"/>
-              <a:t>06/02/2018</a:t>
+              <a:t>27/06/2018</a:t>
             </a:fld>
             <a:endParaRPr lang="es-ES"/>
           </a:p>
@@ -2570,7 +2586,7 @@
           <a:p>
             <a:pPr lvl="0"/>
             <a:fld id="{9CD591F2-ADE7-4A68-8658-5CB49CD78AF7}" type="slidenum">
-              <a:t>‹#›</a:t>
+              <a:t>‹Nº›</a:t>
             </a:fld>
             <a:endParaRPr lang="es-ES"/>
           </a:p>
@@ -2774,7 +2790,7 @@
             <a:fld id="{24762EBF-34CD-4933-BF72-36A3CB2A6772}" type="datetime1">
               <a:rPr lang="es-ES"/>
               <a:pPr lvl="0"/>
-              <a:t>06/02/2018</a:t>
+              <a:t>27/06/2018</a:t>
             </a:fld>
             <a:endParaRPr lang="es-ES"/>
           </a:p>
@@ -2883,7 +2899,7 @@
           <a:p>
             <a:pPr lvl="0"/>
             <a:fld id="{2C9614E4-57D1-49A6-A5A6-A6C074EF6530}" type="slidenum">
-              <a:t>‹#›</a:t>
+              <a:t>‹Nº›</a:t>
             </a:fld>
             <a:endParaRPr lang="es-ES"/>
           </a:p>
@@ -15826,6 +15842,32 @@
           </a:p>
         </p:txBody>
       </p:sp>
+      <p:cxnSp>
+        <p:nvCxnSpPr>
+          <p:cNvPr id="268" name="Straight Arrow Connector 70"/>
+          <p:cNvCxnSpPr>
+            <a:stCxn id="36" idx="0"/>
+          </p:cNvCxnSpPr>
+          <p:nvPr/>
+        </p:nvCxnSpPr>
+        <p:spPr>
+          <a:xfrm flipV="1">
+            <a:off x="4852849" y="1048029"/>
+            <a:ext cx="0" cy="129388"/>
+          </a:xfrm>
+          <a:prstGeom prst="straightConnector1">
+            <a:avLst/>
+          </a:prstGeom>
+          <a:noFill/>
+          <a:ln w="9528">
+            <a:solidFill>
+              <a:srgbClr val="000000"/>
+            </a:solidFill>
+            <a:prstDash val="solid"/>
+            <a:tailEnd type="arrow"/>
+          </a:ln>
+        </p:spPr>
+      </p:cxnSp>
     </p:spTree>
   </p:cSld>
   <p:clrMapOvr>

</xml_diff>